<commit_message>
commit before rebase to gh-pages branch
</commit_message>
<xml_diff>
--- a/01Presentation/Modul1-Project-Mr.Mäxchen.pptx
+++ b/01Presentation/Modul1-Project-Mr.Mäxchen.pptx
@@ -262,7 +262,7 @@
           <a:p>
             <a:fld id="{5FBF16C9-7FDA-EC44-B1C0-F58A733469AD}" type="datetimeFigureOut">
               <a:rPr lang="de-DE" smtClean="0"/>
-              <a:t>17.10.20</a:t>
+              <a:t>22.10.20</a:t>
             </a:fld>
             <a:endParaRPr lang="de-DE"/>
           </a:p>
@@ -460,7 +460,7 @@
           <a:p>
             <a:fld id="{5FBF16C9-7FDA-EC44-B1C0-F58A733469AD}" type="datetimeFigureOut">
               <a:rPr lang="de-DE" smtClean="0"/>
-              <a:t>17.10.20</a:t>
+              <a:t>22.10.20</a:t>
             </a:fld>
             <a:endParaRPr lang="de-DE"/>
           </a:p>
@@ -668,7 +668,7 @@
           <a:p>
             <a:fld id="{5FBF16C9-7FDA-EC44-B1C0-F58A733469AD}" type="datetimeFigureOut">
               <a:rPr lang="de-DE" smtClean="0"/>
-              <a:t>17.10.20</a:t>
+              <a:t>22.10.20</a:t>
             </a:fld>
             <a:endParaRPr lang="de-DE"/>
           </a:p>
@@ -866,7 +866,7 @@
           <a:p>
             <a:fld id="{5FBF16C9-7FDA-EC44-B1C0-F58A733469AD}" type="datetimeFigureOut">
               <a:rPr lang="de-DE" smtClean="0"/>
-              <a:t>17.10.20</a:t>
+              <a:t>22.10.20</a:t>
             </a:fld>
             <a:endParaRPr lang="de-DE"/>
           </a:p>
@@ -1141,7 +1141,7 @@
           <a:p>
             <a:fld id="{5FBF16C9-7FDA-EC44-B1C0-F58A733469AD}" type="datetimeFigureOut">
               <a:rPr lang="de-DE" smtClean="0"/>
-              <a:t>17.10.20</a:t>
+              <a:t>22.10.20</a:t>
             </a:fld>
             <a:endParaRPr lang="de-DE"/>
           </a:p>
@@ -1406,7 +1406,7 @@
           <a:p>
             <a:fld id="{5FBF16C9-7FDA-EC44-B1C0-F58A733469AD}" type="datetimeFigureOut">
               <a:rPr lang="de-DE" smtClean="0"/>
-              <a:t>17.10.20</a:t>
+              <a:t>22.10.20</a:t>
             </a:fld>
             <a:endParaRPr lang="de-DE"/>
           </a:p>
@@ -1818,7 +1818,7 @@
           <a:p>
             <a:fld id="{5FBF16C9-7FDA-EC44-B1C0-F58A733469AD}" type="datetimeFigureOut">
               <a:rPr lang="de-DE" smtClean="0"/>
-              <a:t>17.10.20</a:t>
+              <a:t>22.10.20</a:t>
             </a:fld>
             <a:endParaRPr lang="de-DE"/>
           </a:p>
@@ -1959,7 +1959,7 @@
           <a:p>
             <a:fld id="{5FBF16C9-7FDA-EC44-B1C0-F58A733469AD}" type="datetimeFigureOut">
               <a:rPr lang="de-DE" smtClean="0"/>
-              <a:t>17.10.20</a:t>
+              <a:t>22.10.20</a:t>
             </a:fld>
             <a:endParaRPr lang="de-DE"/>
           </a:p>
@@ -2072,7 +2072,7 @@
           <a:p>
             <a:fld id="{5FBF16C9-7FDA-EC44-B1C0-F58A733469AD}" type="datetimeFigureOut">
               <a:rPr lang="de-DE" smtClean="0"/>
-              <a:t>17.10.20</a:t>
+              <a:t>22.10.20</a:t>
             </a:fld>
             <a:endParaRPr lang="de-DE"/>
           </a:p>
@@ -2383,7 +2383,7 @@
           <a:p>
             <a:fld id="{5FBF16C9-7FDA-EC44-B1C0-F58A733469AD}" type="datetimeFigureOut">
               <a:rPr lang="de-DE" smtClean="0"/>
-              <a:t>17.10.20</a:t>
+              <a:t>22.10.20</a:t>
             </a:fld>
             <a:endParaRPr lang="de-DE"/>
           </a:p>
@@ -2671,7 +2671,7 @@
           <a:p>
             <a:fld id="{5FBF16C9-7FDA-EC44-B1C0-F58A733469AD}" type="datetimeFigureOut">
               <a:rPr lang="de-DE" smtClean="0"/>
-              <a:t>17.10.20</a:t>
+              <a:t>22.10.20</a:t>
             </a:fld>
             <a:endParaRPr lang="de-DE"/>
           </a:p>
@@ -2912,7 +2912,7 @@
           <a:p>
             <a:fld id="{5FBF16C9-7FDA-EC44-B1C0-F58A733469AD}" type="datetimeFigureOut">
               <a:rPr lang="de-DE" smtClean="0"/>
-              <a:t>17.10.20</a:t>
+              <a:t>22.10.20</a:t>
             </a:fld>
             <a:endParaRPr lang="de-DE"/>
           </a:p>
@@ -3633,7 +3633,7 @@
           <a:lstStyle/>
           <a:p>
             <a:r>
-              <a:rPr lang="en-GB" sz="1600"/>
+              <a:rPr lang="en-GB" sz="1600" dirty="0"/>
               <a:t>31 &lt; 32 &lt; 41 &lt; 42 &lt; 43 &lt; 51 &lt; 52 &lt; 53 &lt; 54 &lt; 61 &lt; 62 &lt; 63 &lt; 64 &lt; 65 &lt; 11 &lt; 22 &lt; 33 &lt; 44 &lt; 55 &lt; 66 &lt; 21</a:t>
             </a:r>
           </a:p>
@@ -4359,7 +4359,7 @@
         </p:nvCxnSpPr>
         <p:spPr>
           <a:xfrm>
-            <a:off x="3666120" y="4070970"/>
+            <a:off x="3666120" y="4093830"/>
             <a:ext cx="516870" cy="0"/>
           </a:xfrm>
           <a:prstGeom prst="straightConnector1">
@@ -4916,7 +4916,7 @@
         </p:nvCxnSpPr>
         <p:spPr>
           <a:xfrm flipH="1">
-            <a:off x="3263071" y="4070970"/>
+            <a:off x="3263071" y="4093830"/>
             <a:ext cx="403049" cy="0"/>
           </a:xfrm>
           <a:prstGeom prst="line">
@@ -5587,7 +5587,7 @@
         </p:nvCxnSpPr>
         <p:spPr>
           <a:xfrm>
-            <a:off x="8030071" y="4072523"/>
+            <a:off x="8030071" y="4095383"/>
             <a:ext cx="516870" cy="0"/>
           </a:xfrm>
           <a:prstGeom prst="straightConnector1">
@@ -6015,7 +6015,7 @@
         </p:nvCxnSpPr>
         <p:spPr>
           <a:xfrm flipH="1">
-            <a:off x="7627022" y="4072523"/>
+            <a:off x="7627022" y="4095383"/>
             <a:ext cx="403049" cy="0"/>
           </a:xfrm>
           <a:prstGeom prst="line">

</xml_diff>